<commit_message>
aktualizovane prednasky ku skuske
</commit_message>
<xml_diff>
--- a/02-prednaska/02.02-functions.pptx
+++ b/02-prednaska/02.02-functions.pptx
@@ -145,7 +145,7 @@
   <p:extLst>
     <p:ext uri="{521415D9-36F7-43E2-AB2F-B90AF26B5E84}">
       <p14:sectionLst xmlns:p14="http://schemas.microsoft.com/office/powerpoint/2010/main">
-        <p14:section name="Default Section" id="{8EB237B7-1933-7044-8C1D-B35C89A86612}">
+        <p14:section name="What Are Functions" id="{8EB237B7-1933-7044-8C1D-B35C89A86612}">
           <p14:sldIdLst>
             <p14:sldId id="256"/>
             <p14:sldId id="316"/>
@@ -213,10 +213,6 @@
         <p14:section name="_aux" id="{F8972803-9BBA-2249-A9F4-82BB4BAA18BA}">
           <p14:sldIdLst>
             <p14:sldId id="327"/>
-          </p14:sldIdLst>
-        </p14:section>
-        <p14:section name="defining functions" id="{0F0C12D9-A21A-944C-A507-6D9138FD2054}">
-          <p14:sldIdLst>
             <p14:sldId id="298"/>
             <p14:sldId id="341"/>
           </p14:sldIdLst>
@@ -312,7 +308,7 @@
           <a:p>
             <a:fld id="{68E7D346-505E-1545-B2C8-A636C94DDF7E}" type="datetimeFigureOut">
               <a:rPr lang="sk-SK" smtClean="0"/>
-              <a:t>24.9.18</a:t>
+              <a:t>12.12.18</a:t>
             </a:fld>
             <a:endParaRPr lang="sk-SK"/>
           </a:p>
@@ -981,7 +977,7 @@
           <a:p>
             <a:fld id="{4C3459EE-6FEA-064C-A3A4-214589389D3F}" type="datetimeFigureOut">
               <a:rPr lang="sk-SK" smtClean="0"/>
-              <a:t>24.9.18</a:t>
+              <a:t>12.12.18</a:t>
             </a:fld>
             <a:endParaRPr lang="sk-SK"/>
           </a:p>
@@ -1181,7 +1177,7 @@
           <a:p>
             <a:fld id="{4C3459EE-6FEA-064C-A3A4-214589389D3F}" type="datetimeFigureOut">
               <a:rPr lang="sk-SK" smtClean="0"/>
-              <a:t>24.9.18</a:t>
+              <a:t>12.12.18</a:t>
             </a:fld>
             <a:endParaRPr lang="sk-SK"/>
           </a:p>
@@ -1391,7 +1387,7 @@
           <a:p>
             <a:fld id="{4C3459EE-6FEA-064C-A3A4-214589389D3F}" type="datetimeFigureOut">
               <a:rPr lang="sk-SK" smtClean="0"/>
-              <a:t>24.9.18</a:t>
+              <a:t>12.12.18</a:t>
             </a:fld>
             <a:endParaRPr lang="sk-SK"/>
           </a:p>
@@ -1591,7 +1587,7 @@
           <a:p>
             <a:fld id="{4C3459EE-6FEA-064C-A3A4-214589389D3F}" type="datetimeFigureOut">
               <a:rPr lang="sk-SK" smtClean="0"/>
-              <a:t>24.9.18</a:t>
+              <a:t>12.12.18</a:t>
             </a:fld>
             <a:endParaRPr lang="sk-SK"/>
           </a:p>
@@ -1867,7 +1863,7 @@
           <a:p>
             <a:fld id="{4C3459EE-6FEA-064C-A3A4-214589389D3F}" type="datetimeFigureOut">
               <a:rPr lang="sk-SK" smtClean="0"/>
-              <a:t>24.9.18</a:t>
+              <a:t>12.12.18</a:t>
             </a:fld>
             <a:endParaRPr lang="sk-SK"/>
           </a:p>
@@ -2135,7 +2131,7 @@
           <a:p>
             <a:fld id="{4C3459EE-6FEA-064C-A3A4-214589389D3F}" type="datetimeFigureOut">
               <a:rPr lang="sk-SK" smtClean="0"/>
-              <a:t>24.9.18</a:t>
+              <a:t>12.12.18</a:t>
             </a:fld>
             <a:endParaRPr lang="sk-SK"/>
           </a:p>
@@ -2550,7 +2546,7 @@
           <a:p>
             <a:fld id="{4C3459EE-6FEA-064C-A3A4-214589389D3F}" type="datetimeFigureOut">
               <a:rPr lang="sk-SK" smtClean="0"/>
-              <a:t>24.9.18</a:t>
+              <a:t>12.12.18</a:t>
             </a:fld>
             <a:endParaRPr lang="sk-SK"/>
           </a:p>
@@ -2692,7 +2688,7 @@
           <a:p>
             <a:fld id="{4C3459EE-6FEA-064C-A3A4-214589389D3F}" type="datetimeFigureOut">
               <a:rPr lang="sk-SK" smtClean="0"/>
-              <a:t>24.9.18</a:t>
+              <a:t>12.12.18</a:t>
             </a:fld>
             <a:endParaRPr lang="sk-SK"/>
           </a:p>
@@ -2805,7 +2801,7 @@
           <a:p>
             <a:fld id="{4C3459EE-6FEA-064C-A3A4-214589389D3F}" type="datetimeFigureOut">
               <a:rPr lang="sk-SK" smtClean="0"/>
-              <a:t>24.9.18</a:t>
+              <a:t>12.12.18</a:t>
             </a:fld>
             <a:endParaRPr lang="sk-SK"/>
           </a:p>
@@ -3118,7 +3114,7 @@
           <a:p>
             <a:fld id="{4C3459EE-6FEA-064C-A3A4-214589389D3F}" type="datetimeFigureOut">
               <a:rPr lang="sk-SK" smtClean="0"/>
-              <a:t>24.9.18</a:t>
+              <a:t>12.12.18</a:t>
             </a:fld>
             <a:endParaRPr lang="sk-SK"/>
           </a:p>
@@ -3407,7 +3403,7 @@
           <a:p>
             <a:fld id="{4C3459EE-6FEA-064C-A3A4-214589389D3F}" type="datetimeFigureOut">
               <a:rPr lang="sk-SK" smtClean="0"/>
-              <a:t>24.9.18</a:t>
+              <a:t>12.12.18</a:t>
             </a:fld>
             <a:endParaRPr lang="sk-SK"/>
           </a:p>
@@ -3650,7 +3646,7 @@
           <a:p>
             <a:fld id="{4C3459EE-6FEA-064C-A3A4-214589389D3F}" type="datetimeFigureOut">
               <a:rPr lang="sk-SK" smtClean="0"/>
-              <a:t>24.9.18</a:t>
+              <a:t>12.12.18</a:t>
             </a:fld>
             <a:endParaRPr lang="sk-SK"/>
           </a:p>
@@ -19320,18 +19316,247 @@
           <a:lstStyle/>
           <a:p>
             <a:r>
-              <a:rPr lang="sk-SK"/>
-              <a:t>position of function definition and the position from where the function is executed, are generally not related</a:t>
-            </a:r>
-          </a:p>
-          <a:p>
-            <a:r>
-              <a:rPr lang="sk-SK"/>
-              <a:t>Function defined in one scope can be called in another scopes</a:t>
-            </a:r>
-          </a:p>
-          <a:p>
-            <a:endParaRPr lang="sk-SK"/>
+              <a:rPr lang="sk-SK" dirty="0" err="1"/>
+              <a:t>Position</a:t>
+            </a:r>
+            <a:r>
+              <a:rPr lang="sk-SK" dirty="0"/>
+              <a:t> of </a:t>
+            </a:r>
+            <a:r>
+              <a:rPr lang="sk-SK" dirty="0" err="1"/>
+              <a:t>function</a:t>
+            </a:r>
+            <a:r>
+              <a:rPr lang="sk-SK" dirty="0"/>
+              <a:t> </a:t>
+            </a:r>
+            <a:r>
+              <a:rPr lang="sk-SK" dirty="0" err="1"/>
+              <a:t>definition</a:t>
+            </a:r>
+            <a:r>
+              <a:rPr lang="sk-SK" dirty="0"/>
+              <a:t> and </a:t>
+            </a:r>
+            <a:r>
+              <a:rPr lang="sk-SK" dirty="0" err="1"/>
+              <a:t>the</a:t>
+            </a:r>
+            <a:r>
+              <a:rPr lang="sk-SK" dirty="0"/>
+              <a:t> </a:t>
+            </a:r>
+            <a:r>
+              <a:rPr lang="sk-SK" dirty="0" err="1"/>
+              <a:t>position</a:t>
+            </a:r>
+            <a:r>
+              <a:rPr lang="sk-SK" dirty="0"/>
+              <a:t> </a:t>
+            </a:r>
+            <a:r>
+              <a:rPr lang="sk-SK" dirty="0" err="1"/>
+              <a:t>from</a:t>
+            </a:r>
+            <a:r>
+              <a:rPr lang="sk-SK" dirty="0"/>
+              <a:t> </a:t>
+            </a:r>
+            <a:r>
+              <a:rPr lang="sk-SK" dirty="0" err="1"/>
+              <a:t>where</a:t>
+            </a:r>
+            <a:r>
+              <a:rPr lang="sk-SK" dirty="0"/>
+              <a:t> </a:t>
+            </a:r>
+            <a:r>
+              <a:rPr lang="sk-SK" dirty="0" err="1"/>
+              <a:t>the</a:t>
+            </a:r>
+            <a:r>
+              <a:rPr lang="sk-SK" dirty="0"/>
+              <a:t> </a:t>
+            </a:r>
+            <a:r>
+              <a:rPr lang="sk-SK" dirty="0" err="1"/>
+              <a:t>function</a:t>
+            </a:r>
+            <a:r>
+              <a:rPr lang="sk-SK" dirty="0"/>
+              <a:t> </a:t>
+            </a:r>
+            <a:r>
+              <a:rPr lang="sk-SK" dirty="0" err="1"/>
+              <a:t>is</a:t>
+            </a:r>
+            <a:r>
+              <a:rPr lang="sk-SK" dirty="0"/>
+              <a:t> </a:t>
+            </a:r>
+            <a:r>
+              <a:rPr lang="sk-SK" dirty="0" err="1"/>
+              <a:t>executed</a:t>
+            </a:r>
+            <a:r>
+              <a:rPr lang="sk-SK" dirty="0"/>
+              <a:t>, are </a:t>
+            </a:r>
+            <a:r>
+              <a:rPr lang="sk-SK" dirty="0" err="1"/>
+              <a:t>generally</a:t>
+            </a:r>
+            <a:r>
+              <a:rPr lang="sk-SK" dirty="0"/>
+              <a:t> </a:t>
+            </a:r>
+            <a:r>
+              <a:rPr lang="sk-SK" dirty="0" err="1"/>
+              <a:t>not</a:t>
+            </a:r>
+            <a:r>
+              <a:rPr lang="sk-SK" dirty="0"/>
+              <a:t> </a:t>
+            </a:r>
+            <a:r>
+              <a:rPr lang="sk-SK" dirty="0" err="1"/>
+              <a:t>related</a:t>
+            </a:r>
+            <a:endParaRPr lang="sk-SK" dirty="0"/>
+          </a:p>
+          <a:p>
+            <a:r>
+              <a:rPr lang="sk-SK" dirty="0" err="1"/>
+              <a:t>Function</a:t>
+            </a:r>
+            <a:r>
+              <a:rPr lang="sk-SK" dirty="0"/>
+              <a:t> </a:t>
+            </a:r>
+            <a:r>
+              <a:rPr lang="sk-SK" dirty="0" err="1"/>
+              <a:t>defined</a:t>
+            </a:r>
+            <a:r>
+              <a:rPr lang="sk-SK" dirty="0"/>
+              <a:t> in </a:t>
+            </a:r>
+            <a:r>
+              <a:rPr lang="sk-SK" dirty="0" err="1"/>
+              <a:t>one</a:t>
+            </a:r>
+            <a:r>
+              <a:rPr lang="sk-SK" dirty="0"/>
+              <a:t> </a:t>
+            </a:r>
+            <a:r>
+              <a:rPr lang="sk-SK" dirty="0" err="1"/>
+              <a:t>scope</a:t>
+            </a:r>
+            <a:r>
+              <a:rPr lang="sk-SK" dirty="0"/>
+              <a:t> </a:t>
+            </a:r>
+            <a:r>
+              <a:rPr lang="sk-SK" dirty="0" err="1"/>
+              <a:t>can</a:t>
+            </a:r>
+            <a:r>
+              <a:rPr lang="sk-SK" dirty="0"/>
+              <a:t> </a:t>
+            </a:r>
+            <a:r>
+              <a:rPr lang="sk-SK" dirty="0" err="1"/>
+              <a:t>be</a:t>
+            </a:r>
+            <a:r>
+              <a:rPr lang="sk-SK" dirty="0"/>
+              <a:t> </a:t>
+            </a:r>
+            <a:r>
+              <a:rPr lang="sk-SK" dirty="0" err="1"/>
+              <a:t>called</a:t>
+            </a:r>
+            <a:r>
+              <a:rPr lang="sk-SK" dirty="0"/>
+              <a:t> in </a:t>
+            </a:r>
+            <a:r>
+              <a:rPr lang="sk-SK" dirty="0" err="1"/>
+              <a:t>another</a:t>
+            </a:r>
+            <a:r>
+              <a:rPr lang="sk-SK" dirty="0"/>
+              <a:t> </a:t>
+            </a:r>
+            <a:r>
+              <a:rPr lang="sk-SK" dirty="0" err="1"/>
+              <a:t>scopes</a:t>
+            </a:r>
+            <a:endParaRPr lang="sk-SK" dirty="0"/>
+          </a:p>
+          <a:p>
+            <a:r>
+              <a:rPr lang="sk-SK" dirty="0" err="1"/>
+              <a:t>Function</a:t>
+            </a:r>
+            <a:r>
+              <a:rPr lang="sk-SK" dirty="0"/>
+              <a:t> </a:t>
+            </a:r>
+            <a:r>
+              <a:rPr lang="sk-SK" dirty="0" err="1"/>
+              <a:t>remembers</a:t>
+            </a:r>
+            <a:r>
+              <a:rPr lang="sk-SK" dirty="0"/>
+              <a:t> </a:t>
+            </a:r>
+            <a:r>
+              <a:rPr lang="sk-SK" dirty="0" err="1"/>
+              <a:t>all</a:t>
+            </a:r>
+            <a:r>
+              <a:rPr lang="sk-SK" dirty="0"/>
+              <a:t> </a:t>
+            </a:r>
+            <a:r>
+              <a:rPr lang="sk-SK" i="1" dirty="0" err="1"/>
+              <a:t>definition</a:t>
+            </a:r>
+            <a:r>
+              <a:rPr lang="sk-SK" i="1" dirty="0"/>
+              <a:t> </a:t>
+            </a:r>
+            <a:r>
+              <a:rPr lang="sk-SK" i="1" dirty="0" err="1"/>
+              <a:t>scope</a:t>
+            </a:r>
+            <a:r>
+              <a:rPr lang="sk-SK" i="1" dirty="0"/>
+              <a:t> </a:t>
+            </a:r>
+            <a:r>
+              <a:rPr lang="sk-SK" i="1" dirty="0" err="1"/>
+              <a:t>variables</a:t>
+            </a:r>
+            <a:r>
+              <a:rPr lang="sk-SK" i="1" dirty="0"/>
+              <a:t> </a:t>
+            </a:r>
+            <a:r>
+              <a:rPr lang="sk-SK" dirty="0"/>
+              <a:t>in </a:t>
+            </a:r>
+            <a:r>
+              <a:rPr lang="sk-SK" dirty="0" err="1"/>
+              <a:t>closure</a:t>
+            </a:r>
+            <a:endParaRPr lang="sk-SK" dirty="0"/>
+          </a:p>
+          <a:p>
+            <a:endParaRPr lang="sk-SK" dirty="0"/>
           </a:p>
         </p:txBody>
       </p:sp>
@@ -20284,11 +20509,58 @@
           <a:p>
             <a:r>
               <a:rPr lang="sk-SK" b="1" dirty="0"/>
-              <a:t>only one function executed at the time (stack, event loop)</a:t>
-            </a:r>
-          </a:p>
-          <a:p>
-            <a:pPr lvl="1"/>
+              <a:t>only one function executed at the time (stack, event </a:t>
+            </a:r>
+            <a:r>
+              <a:rPr lang="sk-SK" b="1" dirty="0" err="1"/>
+              <a:t>loop</a:t>
+            </a:r>
+            <a:r>
+              <a:rPr lang="sk-SK" b="1" dirty="0"/>
+              <a:t>)</a:t>
+            </a:r>
+          </a:p>
+          <a:p>
+            <a:r>
+              <a:rPr lang="sk-SK" b="1" dirty="0"/>
+              <a:t>run-to-</a:t>
+            </a:r>
+            <a:r>
+              <a:rPr lang="sk-SK" b="1" dirty="0" err="1"/>
+              <a:t>completion</a:t>
+            </a:r>
+            <a:r>
+              <a:rPr lang="sk-SK" b="1" dirty="0"/>
+              <a:t> – </a:t>
+            </a:r>
+            <a:r>
+              <a:rPr lang="sk-SK" dirty="0" err="1"/>
+              <a:t>whole</a:t>
+            </a:r>
+            <a:r>
+              <a:rPr lang="sk-SK" dirty="0"/>
+              <a:t> </a:t>
+            </a:r>
+            <a:r>
+              <a:rPr lang="sk-SK" dirty="0" err="1"/>
+              <a:t>function</a:t>
+            </a:r>
+            <a:r>
+              <a:rPr lang="sk-SK" dirty="0"/>
+              <a:t> </a:t>
+            </a:r>
+            <a:r>
+              <a:rPr lang="sk-SK" dirty="0" err="1"/>
+              <a:t>is</a:t>
+            </a:r>
+            <a:r>
+              <a:rPr lang="sk-SK" dirty="0"/>
+              <a:t> </a:t>
+            </a:r>
+            <a:r>
+              <a:rPr lang="sk-SK" dirty="0" err="1"/>
+              <a:t>executed</a:t>
+            </a:r>
             <a:endParaRPr lang="sk-SK" dirty="0"/>
           </a:p>
         </p:txBody>
@@ -21485,7 +21757,7 @@
             </a:r>
             <a:r>
               <a:rPr lang="sk-SK" dirty="0"/>
-              <a:t> a rozumieť kedy má akú hodnotu podľa spôsobu definície a typu volania funkcie</a:t>
+              <a:t> a rozumieť, kedy má akú hodnotu podľa spôsobu definície a typu volania funkcie</a:t>
             </a:r>
           </a:p>
           <a:p>
@@ -21521,6 +21793,14 @@
 <file path=ppt/slides/slide34.xml><?xml version="1.0" encoding="utf-8"?>
 <p:sld xmlns:a="http://schemas.openxmlformats.org/drawingml/2006/main" xmlns:r="http://schemas.openxmlformats.org/officeDocument/2006/relationships" xmlns:p="http://schemas.openxmlformats.org/presentationml/2006/main">
   <p:cSld>
+    <p:bg>
+      <p:bgPr>
+        <a:solidFill>
+          <a:schemeClr val="bg1"/>
+        </a:solidFill>
+        <a:effectLst/>
+      </p:bgPr>
+    </p:bg>
     <p:spTree>
       <p:nvGrpSpPr>
         <p:cNvPr id="1" name=""/>
@@ -21537,6 +21817,136 @@
       </p:grpSpPr>
       <p:sp>
         <p:nvSpPr>
+          <p:cNvPr id="10" name="Rectangle 9">
+            <a:extLst>
+              <a:ext uri="{FF2B5EF4-FFF2-40B4-BE49-F238E27FC236}">
+                <a16:creationId xmlns:a16="http://schemas.microsoft.com/office/drawing/2014/main" id="{23962611-DFD5-4092-AAFD-559E3DFCE2C9}"/>
+              </a:ext>
+              <a:ext uri="{C183D7F6-B498-43B3-948B-1728B52AA6E4}">
+                <adec:decorative xmlns:adec="http://schemas.microsoft.com/office/drawing/2017/decorative" val="1"/>
+              </a:ext>
+            </a:extLst>
+          </p:cNvPr>
+          <p:cNvSpPr>
+            <a:spLocks noGrp="1" noRot="1" noChangeAspect="1" noMove="1" noResize="1" noEditPoints="1" noAdjustHandles="1" noChangeArrowheads="1" noChangeShapeType="1" noTextEdit="1"/>
+          </p:cNvSpPr>
+          <p:nvPr>
+            <p:extLst>
+              <p:ext uri="{386F3935-93C4-4BCD-93E2-E3B085C9AB24}">
+                <p16:designElem xmlns:p16="http://schemas.microsoft.com/office/powerpoint/2015/main" val="1"/>
+              </p:ext>
+            </p:extLst>
+          </p:nvPr>
+        </p:nvSpPr>
+        <p:spPr>
+          <a:xfrm>
+            <a:off x="475488" y="0"/>
+            <a:ext cx="10910292" cy="6858000"/>
+          </a:xfrm>
+          <a:prstGeom prst="rect">
+            <a:avLst/>
+          </a:prstGeom>
+          <a:gradFill>
+            <a:gsLst>
+              <a:gs pos="0">
+                <a:schemeClr val="accent1">
+                  <a:lumMod val="90000"/>
+                </a:schemeClr>
+              </a:gs>
+              <a:gs pos="25000">
+                <a:schemeClr val="accent1">
+                  <a:lumMod val="90000"/>
+                </a:schemeClr>
+              </a:gs>
+              <a:gs pos="94000">
+                <a:schemeClr val="bg2">
+                  <a:lumMod val="25000"/>
+                </a:schemeClr>
+              </a:gs>
+              <a:gs pos="100000">
+                <a:schemeClr val="bg2">
+                  <a:lumMod val="25000"/>
+                </a:schemeClr>
+              </a:gs>
+            </a:gsLst>
+            <a:lin ang="4200000" scaled="0"/>
+          </a:gradFill>
+          <a:ln>
+            <a:noFill/>
+          </a:ln>
+        </p:spPr>
+        <p:style>
+          <a:lnRef idx="2">
+            <a:schemeClr val="accent1">
+              <a:shade val="50000"/>
+            </a:schemeClr>
+          </a:lnRef>
+          <a:fillRef idx="1">
+            <a:schemeClr val="accent1"/>
+          </a:fillRef>
+          <a:effectRef idx="0">
+            <a:schemeClr val="accent1"/>
+          </a:effectRef>
+          <a:fontRef idx="minor">
+            <a:schemeClr val="lt1"/>
+          </a:fontRef>
+        </p:style>
+        <p:txBody>
+          <a:bodyPr rtlCol="0" anchor="ctr"/>
+          <a:lstStyle/>
+          <a:p>
+            <a:pPr algn="ctr"/>
+            <a:endParaRPr lang="en-US"/>
+          </a:p>
+        </p:txBody>
+      </p:sp>
+      <p:pic>
+        <p:nvPicPr>
+          <p:cNvPr id="12" name="Picture 11">
+            <a:extLst>
+              <a:ext uri="{FF2B5EF4-FFF2-40B4-BE49-F238E27FC236}">
+                <a16:creationId xmlns:a16="http://schemas.microsoft.com/office/drawing/2014/main" id="{2270F1FA-0425-408F-9861-80BF5AFB276D}"/>
+              </a:ext>
+              <a:ext uri="{C183D7F6-B498-43B3-948B-1728B52AA6E4}">
+                <adec:decorative xmlns:adec="http://schemas.microsoft.com/office/drawing/2017/decorative" val="1"/>
+              </a:ext>
+            </a:extLst>
+          </p:cNvPr>
+          <p:cNvPicPr>
+            <a:picLocks noGrp="1" noRot="1" noChangeAspect="1" noMove="1" noResize="1" noEditPoints="1" noAdjustHandles="1" noChangeArrowheads="1" noChangeShapeType="1" noCrop="1"/>
+          </p:cNvPicPr>
+          <p:nvPr>
+            <p:extLst>
+              <p:ext uri="{386F3935-93C4-4BCD-93E2-E3B085C9AB24}">
+                <p16:designElem xmlns:p16="http://schemas.microsoft.com/office/powerpoint/2015/main" val="1"/>
+              </p:ext>
+            </p:extLst>
+          </p:nvPr>
+        </p:nvPicPr>
+        <p:blipFill>
+          <a:blip r:embed="rId2">
+            <a:extLst>
+              <a:ext uri="{28A0092B-C50C-407E-A947-70E740481C1C}">
+                <a14:useLocalDpi xmlns:a14="http://schemas.microsoft.com/office/drawing/2010/main" val="0"/>
+              </a:ext>
+            </a:extLst>
+          </a:blip>
+          <a:stretch>
+            <a:fillRect/>
+          </a:stretch>
+        </p:blipFill>
+        <p:spPr>
+          <a:xfrm>
+            <a:off x="0" y="0"/>
+            <a:ext cx="12192000" cy="6858000"/>
+          </a:xfrm>
+          <a:prstGeom prst="rect">
+            <a:avLst/>
+          </a:prstGeom>
+        </p:spPr>
+      </p:pic>
+      <p:sp>
+        <p:nvSpPr>
           <p:cNvPr id="2" name="Title 1">
             <a:extLst>
               <a:ext uri="{FF2B5EF4-FFF2-40B4-BE49-F238E27FC236}">
@@ -21551,13 +21961,24 @@
             <p:ph type="ctrTitle"/>
           </p:nvPr>
         </p:nvSpPr>
-        <p:spPr/>
+        <p:spPr>
+          <a:xfrm>
+            <a:off x="3045368" y="2043663"/>
+            <a:ext cx="6105194" cy="2031055"/>
+          </a:xfrm>
+        </p:spPr>
         <p:txBody>
-          <a:bodyPr/>
+          <a:bodyPr>
+            <a:normAutofit/>
+          </a:bodyPr>
           <a:lstStyle/>
           <a:p>
             <a:r>
-              <a:rPr lang="sk-SK"/>
+              <a:rPr lang="sk-SK">
+                <a:solidFill>
+                  <a:srgbClr val="FFFFFF"/>
+                </a:solidFill>
+              </a:rPr>
               <a:t>_aux</a:t>
             </a:r>
           </a:p>
@@ -21565,10 +21986,10 @@
       </p:sp>
       <p:sp>
         <p:nvSpPr>
-          <p:cNvPr id="3" name="Subtitle 2">
-            <a:extLst>
-              <a:ext uri="{FF2B5EF4-FFF2-40B4-BE49-F238E27FC236}">
-                <a16:creationId xmlns:a16="http://schemas.microsoft.com/office/drawing/2014/main" id="{93C3F351-D230-0D41-9B5C-73FAF5698F67}"/>
+          <p:cNvPr id="5" name="Subtitle 4">
+            <a:extLst>
+              <a:ext uri="{FF2B5EF4-FFF2-40B4-BE49-F238E27FC236}">
+                <a16:creationId xmlns:a16="http://schemas.microsoft.com/office/drawing/2014/main" id="{8EA04AC5-19B8-5444-B10D-18059D5478D4}"/>
               </a:ext>
             </a:extLst>
           </p:cNvPr>
@@ -21579,12 +22000,23 @@
             <p:ph type="subTitle" idx="1"/>
           </p:nvPr>
         </p:nvSpPr>
-        <p:spPr/>
+        <p:spPr>
+          <a:xfrm>
+            <a:off x="3045368" y="4074718"/>
+            <a:ext cx="6105194" cy="682079"/>
+          </a:xfrm>
+        </p:spPr>
         <p:txBody>
-          <a:bodyPr/>
+          <a:bodyPr>
+            <a:normAutofit/>
+          </a:bodyPr>
           <a:lstStyle/>
           <a:p>
-            <a:endParaRPr lang="sk-SK"/>
+            <a:endParaRPr lang="sk-SK">
+              <a:solidFill>
+                <a:srgbClr val="FFFFFF"/>
+              </a:solidFill>
+            </a:endParaRPr>
           </a:p>
         </p:txBody>
       </p:sp>

</xml_diff>